<commit_message>
Modified user manual, formatted for PDF and HTML.
</commit_message>
<xml_diff>
--- a/documentation/figures/overview.pptx
+++ b/documentation/figures/overview.pptx
@@ -105,6 +105,22 @@
       </a:defRPr>
     </a:lvl9pPr>
   </p:defaultTextStyle>
+  <p:extLst>
+    <p:ext uri="{EFAFB233-063F-42B5-8137-9DF3F51BA10A}">
+      <p15:sldGuideLst xmlns:p15="http://schemas.microsoft.com/office/powerpoint/2012/main">
+        <p15:guide id="1" orient="horz" pos="2160">
+          <p15:clr>
+            <a:srgbClr val="A4A3A4"/>
+          </p15:clr>
+        </p15:guide>
+        <p15:guide id="2" pos="2880">
+          <p15:clr>
+            <a:srgbClr val="A4A3A4"/>
+          </p15:clr>
+        </p15:guide>
+      </p15:sldGuideLst>
+    </p:ext>
+  </p:extLst>
 </p:presentation>
 </file>
 
@@ -290,7 +306,7 @@
             <a:fld id="{1D8BD707-D9CF-40AE-B4C6-C98DA3205C09}" type="datetimeFigureOut">
               <a:rPr lang="en-US" smtClean="0"/>
               <a:pPr/>
-              <a:t>2/22/2016</a:t>
+              <a:t>10/13/2016</a:t>
             </a:fld>
             <a:endParaRPr lang="en-US"/>
           </a:p>
@@ -457,7 +473,7 @@
             <a:fld id="{1D8BD707-D9CF-40AE-B4C6-C98DA3205C09}" type="datetimeFigureOut">
               <a:rPr lang="en-US" smtClean="0"/>
               <a:pPr/>
-              <a:t>2/22/2016</a:t>
+              <a:t>10/13/2016</a:t>
             </a:fld>
             <a:endParaRPr lang="en-US"/>
           </a:p>
@@ -634,7 +650,7 @@
             <a:fld id="{1D8BD707-D9CF-40AE-B4C6-C98DA3205C09}" type="datetimeFigureOut">
               <a:rPr lang="en-US" smtClean="0"/>
               <a:pPr/>
-              <a:t>2/22/2016</a:t>
+              <a:t>10/13/2016</a:t>
             </a:fld>
             <a:endParaRPr lang="en-US"/>
           </a:p>
@@ -801,7 +817,7 @@
             <a:fld id="{1D8BD707-D9CF-40AE-B4C6-C98DA3205C09}" type="datetimeFigureOut">
               <a:rPr lang="en-US" smtClean="0"/>
               <a:pPr/>
-              <a:t>2/22/2016</a:t>
+              <a:t>10/13/2016</a:t>
             </a:fld>
             <a:endParaRPr lang="en-US"/>
           </a:p>
@@ -1044,7 +1060,7 @@
             <a:fld id="{1D8BD707-D9CF-40AE-B4C6-C98DA3205C09}" type="datetimeFigureOut">
               <a:rPr lang="en-US" smtClean="0"/>
               <a:pPr/>
-              <a:t>2/22/2016</a:t>
+              <a:t>10/13/2016</a:t>
             </a:fld>
             <a:endParaRPr lang="en-US"/>
           </a:p>
@@ -1329,7 +1345,7 @@
             <a:fld id="{1D8BD707-D9CF-40AE-B4C6-C98DA3205C09}" type="datetimeFigureOut">
               <a:rPr lang="en-US" smtClean="0"/>
               <a:pPr/>
-              <a:t>2/22/2016</a:t>
+              <a:t>10/13/2016</a:t>
             </a:fld>
             <a:endParaRPr lang="en-US"/>
           </a:p>
@@ -1748,7 +1764,7 @@
             <a:fld id="{1D8BD707-D9CF-40AE-B4C6-C98DA3205C09}" type="datetimeFigureOut">
               <a:rPr lang="en-US" smtClean="0"/>
               <a:pPr/>
-              <a:t>2/22/2016</a:t>
+              <a:t>10/13/2016</a:t>
             </a:fld>
             <a:endParaRPr lang="en-US"/>
           </a:p>
@@ -1863,7 +1879,7 @@
             <a:fld id="{1D8BD707-D9CF-40AE-B4C6-C98DA3205C09}" type="datetimeFigureOut">
               <a:rPr lang="en-US" smtClean="0"/>
               <a:pPr/>
-              <a:t>2/22/2016</a:t>
+              <a:t>10/13/2016</a:t>
             </a:fld>
             <a:endParaRPr lang="en-US"/>
           </a:p>
@@ -1955,7 +1971,7 @@
             <a:fld id="{1D8BD707-D9CF-40AE-B4C6-C98DA3205C09}" type="datetimeFigureOut">
               <a:rPr lang="en-US" smtClean="0"/>
               <a:pPr/>
-              <a:t>2/22/2016</a:t>
+              <a:t>10/13/2016</a:t>
             </a:fld>
             <a:endParaRPr lang="en-US"/>
           </a:p>
@@ -2229,7 +2245,7 @@
             <a:fld id="{1D8BD707-D9CF-40AE-B4C6-C98DA3205C09}" type="datetimeFigureOut">
               <a:rPr lang="en-US" smtClean="0"/>
               <a:pPr/>
-              <a:t>2/22/2016</a:t>
+              <a:t>10/13/2016</a:t>
             </a:fld>
             <a:endParaRPr lang="en-US"/>
           </a:p>
@@ -2479,7 +2495,7 @@
             <a:fld id="{1D8BD707-D9CF-40AE-B4C6-C98DA3205C09}" type="datetimeFigureOut">
               <a:rPr lang="en-US" smtClean="0"/>
               <a:pPr/>
-              <a:t>2/22/2016</a:t>
+              <a:t>10/13/2016</a:t>
             </a:fld>
             <a:endParaRPr lang="en-US"/>
           </a:p>
@@ -2689,7 +2705,7 @@
             <a:fld id="{1D8BD707-D9CF-40AE-B4C6-C98DA3205C09}" type="datetimeFigureOut">
               <a:rPr lang="en-US" smtClean="0"/>
               <a:pPr/>
-              <a:t>2/22/2016</a:t>
+              <a:t>10/13/2016</a:t>
             </a:fld>
             <a:endParaRPr lang="en-US"/>
           </a:p>
@@ -3062,28 +3078,28 @@
       </p:grpSpPr>
       <p:grpSp>
         <p:nvGrpSpPr>
-          <p:cNvPr id="9" name="Group 8"/>
+          <p:cNvPr id="18" name="Group 17"/>
           <p:cNvGrpSpPr/>
           <p:nvPr/>
         </p:nvGrpSpPr>
         <p:grpSpPr>
           <a:xfrm>
-            <a:off x="1205191" y="228600"/>
-            <a:ext cx="4205009" cy="5181600"/>
-            <a:chOff x="1205191" y="228600"/>
-            <a:chExt cx="4205009" cy="5181600"/>
+            <a:off x="197793" y="457200"/>
+            <a:ext cx="8266654" cy="3546362"/>
+            <a:chOff x="197793" y="457200"/>
+            <a:chExt cx="8266654" cy="3546362"/>
           </a:xfrm>
         </p:grpSpPr>
         <p:sp>
           <p:nvSpPr>
-            <p:cNvPr id="8" name="Rectangle 7"/>
+            <p:cNvPr id="16" name="Rectangle 15"/>
             <p:cNvSpPr/>
             <p:nvPr/>
           </p:nvSpPr>
           <p:spPr>
             <a:xfrm>
-              <a:off x="1205191" y="228600"/>
-              <a:ext cx="4205009" cy="5181600"/>
+              <a:off x="197793" y="457200"/>
+              <a:ext cx="8266654" cy="3546362"/>
             </a:xfrm>
             <a:prstGeom prst="rect">
               <a:avLst/>
@@ -3120,84 +3136,125 @@
             </a:p>
           </p:txBody>
         </p:sp>
-        <p:sp>
-          <p:nvSpPr>
-            <p:cNvPr id="7" name="Rectangle 6"/>
-            <p:cNvSpPr/>
+        <p:grpSp>
+          <p:nvGrpSpPr>
+            <p:cNvPr id="11" name="Group 10"/>
+            <p:cNvGrpSpPr/>
             <p:nvPr/>
-          </p:nvSpPr>
-          <p:spPr>
+          </p:nvGrpSpPr>
+          <p:grpSpPr>
             <a:xfrm>
-              <a:off x="1205191" y="685800"/>
-              <a:ext cx="4205009" cy="4724400"/>
+              <a:off x="4664742" y="572605"/>
+              <a:ext cx="2975675" cy="2186040"/>
+              <a:chOff x="3824009" y="304800"/>
+              <a:chExt cx="2975675" cy="2186040"/>
             </a:xfrm>
-            <a:prstGeom prst="rect">
-              <a:avLst/>
-            </a:prstGeom>
-            <a:solidFill>
-              <a:schemeClr val="bg1"/>
-            </a:solidFill>
-            <a:ln>
-              <a:noFill/>
-            </a:ln>
-          </p:spPr>
-          <p:style>
-            <a:lnRef idx="2">
-              <a:schemeClr val="accent1">
-                <a:shade val="50000"/>
-              </a:schemeClr>
-            </a:lnRef>
-            <a:fillRef idx="1">
-              <a:schemeClr val="accent1"/>
-            </a:fillRef>
-            <a:effectRef idx="0">
-              <a:schemeClr val="accent1"/>
-            </a:effectRef>
-            <a:fontRef idx="minor">
-              <a:schemeClr val="lt1"/>
-            </a:fontRef>
-          </p:style>
-          <p:txBody>
-            <a:bodyPr rtlCol="0" anchor="ctr"/>
-            <a:lstStyle/>
-            <a:p>
-              <a:pPr algn="ctr"/>
-              <a:endParaRPr lang="en-US"/>
-            </a:p>
-          </p:txBody>
-        </p:sp>
+          </p:grpSpPr>
+          <p:pic>
+            <p:nvPicPr>
+              <p:cNvPr id="5" name="Picture 4"/>
+              <p:cNvPicPr>
+                <a:picLocks noChangeAspect="1"/>
+              </p:cNvPicPr>
+              <p:nvPr/>
+            </p:nvPicPr>
+            <p:blipFill rotWithShape="1">
+              <a:blip r:embed="rId2">
+                <a:extLst>
+                  <a:ext uri="{28A0092B-C50C-407E-A947-70E740481C1C}">
+                    <a14:useLocalDpi xmlns:a14="http://schemas.microsoft.com/office/drawing/2010/main" val="0"/>
+                  </a:ext>
+                </a:extLst>
+              </a:blip>
+              <a:srcRect l="20375" t="18630" r="15918" b="18011"/>
+              <a:stretch/>
+            </p:blipFill>
+            <p:spPr>
+              <a:xfrm>
+                <a:off x="3824009" y="304800"/>
+                <a:ext cx="2975675" cy="2186040"/>
+              </a:xfrm>
+              <a:prstGeom prst="rect">
+                <a:avLst/>
+              </a:prstGeom>
+            </p:spPr>
+          </p:pic>
+          <p:sp>
+            <p:nvSpPr>
+              <p:cNvPr id="3" name="TextBox 2"/>
+              <p:cNvSpPr txBox="1"/>
+              <p:nvPr/>
+            </p:nvSpPr>
+            <p:spPr>
+              <a:xfrm>
+                <a:off x="5632931" y="1338590"/>
+                <a:ext cx="729687" cy="261610"/>
+              </a:xfrm>
+              <a:prstGeom prst="rect">
+                <a:avLst/>
+              </a:prstGeom>
+              <a:solidFill>
+                <a:schemeClr val="bg1"/>
+              </a:solidFill>
+            </p:spPr>
+            <p:txBody>
+              <a:bodyPr wrap="none" rtlCol="0">
+                <a:spAutoFit/>
+              </a:bodyPr>
+              <a:lstStyle/>
+              <a:p>
+                <a:r>
+                  <a:rPr lang="en-US" sz="1100" dirty="0" smtClean="0"/>
+                  <a:t>Epicenter</a:t>
+                </a:r>
+                <a:endParaRPr lang="en-US" sz="1100" dirty="0"/>
+              </a:p>
+            </p:txBody>
+          </p:sp>
+          <p:sp>
+            <p:nvSpPr>
+              <p:cNvPr id="2" name="5-Point Star 1"/>
+              <p:cNvSpPr/>
+              <p:nvPr/>
+            </p:nvSpPr>
+            <p:spPr>
+              <a:xfrm>
+                <a:off x="5576609" y="1397820"/>
+                <a:ext cx="91440" cy="91440"/>
+              </a:xfrm>
+              <a:prstGeom prst="star5">
+                <a:avLst/>
+              </a:prstGeom>
+            </p:spPr>
+            <p:style>
+              <a:lnRef idx="2">
+                <a:schemeClr val="accent2">
+                  <a:shade val="50000"/>
+                </a:schemeClr>
+              </a:lnRef>
+              <a:fillRef idx="1">
+                <a:schemeClr val="accent2"/>
+              </a:fillRef>
+              <a:effectRef idx="0">
+                <a:schemeClr val="accent2"/>
+              </a:effectRef>
+              <a:fontRef idx="minor">
+                <a:schemeClr val="lt1"/>
+              </a:fontRef>
+            </p:style>
+            <p:txBody>
+              <a:bodyPr rtlCol="0" anchor="ctr"/>
+              <a:lstStyle/>
+              <a:p>
+                <a:pPr algn="ctr"/>
+                <a:endParaRPr lang="en-US"/>
+              </a:p>
+            </p:txBody>
+          </p:sp>
+        </p:grpSp>
         <p:pic>
           <p:nvPicPr>
-            <p:cNvPr id="5" name="Picture 4"/>
-            <p:cNvPicPr>
-              <a:picLocks noChangeAspect="1"/>
-            </p:cNvPicPr>
-            <p:nvPr/>
-          </p:nvPicPr>
-          <p:blipFill rotWithShape="1">
-            <a:blip r:embed="rId2">
-              <a:extLst>
-                <a:ext uri="{28A0092B-C50C-407E-A947-70E740481C1C}">
-                  <a14:useLocalDpi xmlns:a14="http://schemas.microsoft.com/office/drawing/2010/main" val="0"/>
-                </a:ext>
-              </a:extLst>
-            </a:blip>
-            <a:srcRect l="20375" t="18630" r="15918" b="18011"/>
-            <a:stretch/>
-          </p:blipFill>
-          <p:spPr>
-            <a:xfrm>
-              <a:off x="1447800" y="228600"/>
-              <a:ext cx="2975675" cy="2186040"/>
-            </a:xfrm>
-            <a:prstGeom prst="rect">
-              <a:avLst/>
-            </a:prstGeom>
-          </p:spPr>
-        </p:pic>
-        <p:pic>
-          <p:nvPicPr>
-            <p:cNvPr id="6" name="Picture 5"/>
+            <p:cNvPr id="4" name="Picture 3"/>
             <p:cNvPicPr>
               <a:picLocks noChangeAspect="1"/>
             </p:cNvPicPr>
@@ -3217,8 +3274,8 @@
           </p:blipFill>
           <p:spPr>
             <a:xfrm>
-              <a:off x="1291525" y="3505200"/>
-              <a:ext cx="2823275" cy="1713106"/>
+              <a:off x="5942255" y="2184111"/>
+              <a:ext cx="2522192" cy="1752600"/>
             </a:xfrm>
             <a:prstGeom prst="rect">
               <a:avLst/>
@@ -3227,14 +3284,14 @@
         </p:pic>
         <p:pic>
           <p:nvPicPr>
-            <p:cNvPr id="4" name="Picture 3"/>
+            <p:cNvPr id="14" name="Picture 13"/>
             <p:cNvPicPr>
               <a:picLocks noChangeAspect="1"/>
             </p:cNvPicPr>
             <p:nvPr/>
           </p:nvPicPr>
           <p:blipFill>
-            <a:blip r:embed="rId4">
+            <a:blip r:embed="rId4" cstate="print">
               <a:extLst>
                 <a:ext uri="{28A0092B-C50C-407E-A947-70E740481C1C}">
                   <a14:useLocalDpi xmlns:a14="http://schemas.microsoft.com/office/drawing/2010/main" val="0"/>
@@ -3247,86 +3304,43 @@
           </p:blipFill>
           <p:spPr>
             <a:xfrm>
-              <a:off x="2806115" y="2133600"/>
-              <a:ext cx="2522192" cy="1752600"/>
+              <a:off x="228600" y="542605"/>
+              <a:ext cx="3497245" cy="2400941"/>
             </a:xfrm>
             <a:prstGeom prst="rect">
               <a:avLst/>
             </a:prstGeom>
           </p:spPr>
         </p:pic>
-        <p:sp>
-          <p:nvSpPr>
-            <p:cNvPr id="3" name="TextBox 2"/>
-            <p:cNvSpPr txBox="1"/>
+        <p:pic>
+          <p:nvPicPr>
+            <p:cNvPr id="13" name="Picture 12"/>
+            <p:cNvPicPr>
+              <a:picLocks noChangeAspect="1"/>
+            </p:cNvPicPr>
             <p:nvPr/>
-          </p:nvSpPr>
+          </p:nvPicPr>
+          <p:blipFill rotWithShape="1">
+            <a:blip r:embed="rId5" cstate="print">
+              <a:extLst>
+                <a:ext uri="{28A0092B-C50C-407E-A947-70E740481C1C}">
+                  <a14:useLocalDpi xmlns:a14="http://schemas.microsoft.com/office/drawing/2010/main" val="0"/>
+                </a:ext>
+              </a:extLst>
+            </a:blip>
+            <a:srcRect r="162" b="-754"/>
+            <a:stretch/>
+          </p:blipFill>
           <p:spPr>
             <a:xfrm>
-              <a:off x="3256722" y="1262390"/>
-              <a:ext cx="729687" cy="261610"/>
+              <a:off x="1019195" y="1130517"/>
+              <a:ext cx="3499556" cy="2873045"/>
             </a:xfrm>
             <a:prstGeom prst="rect">
               <a:avLst/>
             </a:prstGeom>
-            <a:solidFill>
-              <a:schemeClr val="bg1"/>
-            </a:solidFill>
           </p:spPr>
-          <p:txBody>
-            <a:bodyPr wrap="none" rtlCol="0">
-              <a:spAutoFit/>
-            </a:bodyPr>
-            <a:lstStyle/>
-            <a:p>
-              <a:r>
-                <a:rPr lang="en-US" sz="1100" dirty="0" smtClean="0"/>
-                <a:t>Epicenter</a:t>
-              </a:r>
-              <a:endParaRPr lang="en-US" sz="1100" dirty="0"/>
-            </a:p>
-          </p:txBody>
-        </p:sp>
-        <p:sp>
-          <p:nvSpPr>
-            <p:cNvPr id="2" name="5-Point Star 1"/>
-            <p:cNvSpPr/>
-            <p:nvPr/>
-          </p:nvSpPr>
-          <p:spPr>
-            <a:xfrm>
-              <a:off x="3200400" y="1321620"/>
-              <a:ext cx="91440" cy="91440"/>
-            </a:xfrm>
-            <a:prstGeom prst="star5">
-              <a:avLst/>
-            </a:prstGeom>
-          </p:spPr>
-          <p:style>
-            <a:lnRef idx="2">
-              <a:schemeClr val="accent2">
-                <a:shade val="50000"/>
-              </a:schemeClr>
-            </a:lnRef>
-            <a:fillRef idx="1">
-              <a:schemeClr val="accent2"/>
-            </a:fillRef>
-            <a:effectRef idx="0">
-              <a:schemeClr val="accent2"/>
-            </a:effectRef>
-            <a:fontRef idx="minor">
-              <a:schemeClr val="lt1"/>
-            </a:fontRef>
-          </p:style>
-          <p:txBody>
-            <a:bodyPr rtlCol="0" anchor="ctr"/>
-            <a:lstStyle/>
-            <a:p>
-              <a:pPr algn="ctr"/>
-              <a:endParaRPr lang="en-US"/>
-            </a:p>
-          </p:txBody>
-        </p:sp>
+        </p:pic>
       </p:grpSp>
     </p:spTree>
     <p:extLst>

</xml_diff>

<commit_message>
Stage 1: Safe Python 2
</commit_message>
<xml_diff>
--- a/documentation/figures/overview.pptx
+++ b/documentation/figures/overview.pptx
@@ -105,6 +105,22 @@
       </a:defRPr>
     </a:lvl9pPr>
   </p:defaultTextStyle>
+  <p:extLst>
+    <p:ext uri="{EFAFB233-063F-42B5-8137-9DF3F51BA10A}">
+      <p15:sldGuideLst xmlns:p15="http://schemas.microsoft.com/office/powerpoint/2012/main">
+        <p15:guide id="1" orient="horz" pos="2160">
+          <p15:clr>
+            <a:srgbClr val="A4A3A4"/>
+          </p15:clr>
+        </p15:guide>
+        <p15:guide id="2" pos="2880">
+          <p15:clr>
+            <a:srgbClr val="A4A3A4"/>
+          </p15:clr>
+        </p15:guide>
+      </p15:sldGuideLst>
+    </p:ext>
+  </p:extLst>
 </p:presentation>
 </file>
 
@@ -290,7 +306,7 @@
             <a:fld id="{1D8BD707-D9CF-40AE-B4C6-C98DA3205C09}" type="datetimeFigureOut">
               <a:rPr lang="en-US" smtClean="0"/>
               <a:pPr/>
-              <a:t>2/22/2016</a:t>
+              <a:t>10/13/2016</a:t>
             </a:fld>
             <a:endParaRPr lang="en-US"/>
           </a:p>
@@ -457,7 +473,7 @@
             <a:fld id="{1D8BD707-D9CF-40AE-B4C6-C98DA3205C09}" type="datetimeFigureOut">
               <a:rPr lang="en-US" smtClean="0"/>
               <a:pPr/>
-              <a:t>2/22/2016</a:t>
+              <a:t>10/13/2016</a:t>
             </a:fld>
             <a:endParaRPr lang="en-US"/>
           </a:p>
@@ -634,7 +650,7 @@
             <a:fld id="{1D8BD707-D9CF-40AE-B4C6-C98DA3205C09}" type="datetimeFigureOut">
               <a:rPr lang="en-US" smtClean="0"/>
               <a:pPr/>
-              <a:t>2/22/2016</a:t>
+              <a:t>10/13/2016</a:t>
             </a:fld>
             <a:endParaRPr lang="en-US"/>
           </a:p>
@@ -801,7 +817,7 @@
             <a:fld id="{1D8BD707-D9CF-40AE-B4C6-C98DA3205C09}" type="datetimeFigureOut">
               <a:rPr lang="en-US" smtClean="0"/>
               <a:pPr/>
-              <a:t>2/22/2016</a:t>
+              <a:t>10/13/2016</a:t>
             </a:fld>
             <a:endParaRPr lang="en-US"/>
           </a:p>
@@ -1044,7 +1060,7 @@
             <a:fld id="{1D8BD707-D9CF-40AE-B4C6-C98DA3205C09}" type="datetimeFigureOut">
               <a:rPr lang="en-US" smtClean="0"/>
               <a:pPr/>
-              <a:t>2/22/2016</a:t>
+              <a:t>10/13/2016</a:t>
             </a:fld>
             <a:endParaRPr lang="en-US"/>
           </a:p>
@@ -1329,7 +1345,7 @@
             <a:fld id="{1D8BD707-D9CF-40AE-B4C6-C98DA3205C09}" type="datetimeFigureOut">
               <a:rPr lang="en-US" smtClean="0"/>
               <a:pPr/>
-              <a:t>2/22/2016</a:t>
+              <a:t>10/13/2016</a:t>
             </a:fld>
             <a:endParaRPr lang="en-US"/>
           </a:p>
@@ -1748,7 +1764,7 @@
             <a:fld id="{1D8BD707-D9CF-40AE-B4C6-C98DA3205C09}" type="datetimeFigureOut">
               <a:rPr lang="en-US" smtClean="0"/>
               <a:pPr/>
-              <a:t>2/22/2016</a:t>
+              <a:t>10/13/2016</a:t>
             </a:fld>
             <a:endParaRPr lang="en-US"/>
           </a:p>
@@ -1863,7 +1879,7 @@
             <a:fld id="{1D8BD707-D9CF-40AE-B4C6-C98DA3205C09}" type="datetimeFigureOut">
               <a:rPr lang="en-US" smtClean="0"/>
               <a:pPr/>
-              <a:t>2/22/2016</a:t>
+              <a:t>10/13/2016</a:t>
             </a:fld>
             <a:endParaRPr lang="en-US"/>
           </a:p>
@@ -1955,7 +1971,7 @@
             <a:fld id="{1D8BD707-D9CF-40AE-B4C6-C98DA3205C09}" type="datetimeFigureOut">
               <a:rPr lang="en-US" smtClean="0"/>
               <a:pPr/>
-              <a:t>2/22/2016</a:t>
+              <a:t>10/13/2016</a:t>
             </a:fld>
             <a:endParaRPr lang="en-US"/>
           </a:p>
@@ -2229,7 +2245,7 @@
             <a:fld id="{1D8BD707-D9CF-40AE-B4C6-C98DA3205C09}" type="datetimeFigureOut">
               <a:rPr lang="en-US" smtClean="0"/>
               <a:pPr/>
-              <a:t>2/22/2016</a:t>
+              <a:t>10/13/2016</a:t>
             </a:fld>
             <a:endParaRPr lang="en-US"/>
           </a:p>
@@ -2479,7 +2495,7 @@
             <a:fld id="{1D8BD707-D9CF-40AE-B4C6-C98DA3205C09}" type="datetimeFigureOut">
               <a:rPr lang="en-US" smtClean="0"/>
               <a:pPr/>
-              <a:t>2/22/2016</a:t>
+              <a:t>10/13/2016</a:t>
             </a:fld>
             <a:endParaRPr lang="en-US"/>
           </a:p>
@@ -2689,7 +2705,7 @@
             <a:fld id="{1D8BD707-D9CF-40AE-B4C6-C98DA3205C09}" type="datetimeFigureOut">
               <a:rPr lang="en-US" smtClean="0"/>
               <a:pPr/>
-              <a:t>2/22/2016</a:t>
+              <a:t>10/13/2016</a:t>
             </a:fld>
             <a:endParaRPr lang="en-US"/>
           </a:p>
@@ -3062,28 +3078,28 @@
       </p:grpSpPr>
       <p:grpSp>
         <p:nvGrpSpPr>
-          <p:cNvPr id="9" name="Group 8"/>
+          <p:cNvPr id="18" name="Group 17"/>
           <p:cNvGrpSpPr/>
           <p:nvPr/>
         </p:nvGrpSpPr>
         <p:grpSpPr>
           <a:xfrm>
-            <a:off x="1205191" y="228600"/>
-            <a:ext cx="4205009" cy="5181600"/>
-            <a:chOff x="1205191" y="228600"/>
-            <a:chExt cx="4205009" cy="5181600"/>
+            <a:off x="197793" y="457200"/>
+            <a:ext cx="8266654" cy="3546362"/>
+            <a:chOff x="197793" y="457200"/>
+            <a:chExt cx="8266654" cy="3546362"/>
           </a:xfrm>
         </p:grpSpPr>
         <p:sp>
           <p:nvSpPr>
-            <p:cNvPr id="8" name="Rectangle 7"/>
+            <p:cNvPr id="16" name="Rectangle 15"/>
             <p:cNvSpPr/>
             <p:nvPr/>
           </p:nvSpPr>
           <p:spPr>
             <a:xfrm>
-              <a:off x="1205191" y="228600"/>
-              <a:ext cx="4205009" cy="5181600"/>
+              <a:off x="197793" y="457200"/>
+              <a:ext cx="8266654" cy="3546362"/>
             </a:xfrm>
             <a:prstGeom prst="rect">
               <a:avLst/>
@@ -3120,84 +3136,125 @@
             </a:p>
           </p:txBody>
         </p:sp>
-        <p:sp>
-          <p:nvSpPr>
-            <p:cNvPr id="7" name="Rectangle 6"/>
-            <p:cNvSpPr/>
+        <p:grpSp>
+          <p:nvGrpSpPr>
+            <p:cNvPr id="11" name="Group 10"/>
+            <p:cNvGrpSpPr/>
             <p:nvPr/>
-          </p:nvSpPr>
-          <p:spPr>
+          </p:nvGrpSpPr>
+          <p:grpSpPr>
             <a:xfrm>
-              <a:off x="1205191" y="685800"/>
-              <a:ext cx="4205009" cy="4724400"/>
+              <a:off x="4664742" y="572605"/>
+              <a:ext cx="2975675" cy="2186040"/>
+              <a:chOff x="3824009" y="304800"/>
+              <a:chExt cx="2975675" cy="2186040"/>
             </a:xfrm>
-            <a:prstGeom prst="rect">
-              <a:avLst/>
-            </a:prstGeom>
-            <a:solidFill>
-              <a:schemeClr val="bg1"/>
-            </a:solidFill>
-            <a:ln>
-              <a:noFill/>
-            </a:ln>
-          </p:spPr>
-          <p:style>
-            <a:lnRef idx="2">
-              <a:schemeClr val="accent1">
-                <a:shade val="50000"/>
-              </a:schemeClr>
-            </a:lnRef>
-            <a:fillRef idx="1">
-              <a:schemeClr val="accent1"/>
-            </a:fillRef>
-            <a:effectRef idx="0">
-              <a:schemeClr val="accent1"/>
-            </a:effectRef>
-            <a:fontRef idx="minor">
-              <a:schemeClr val="lt1"/>
-            </a:fontRef>
-          </p:style>
-          <p:txBody>
-            <a:bodyPr rtlCol="0" anchor="ctr"/>
-            <a:lstStyle/>
-            <a:p>
-              <a:pPr algn="ctr"/>
-              <a:endParaRPr lang="en-US"/>
-            </a:p>
-          </p:txBody>
-        </p:sp>
+          </p:grpSpPr>
+          <p:pic>
+            <p:nvPicPr>
+              <p:cNvPr id="5" name="Picture 4"/>
+              <p:cNvPicPr>
+                <a:picLocks noChangeAspect="1"/>
+              </p:cNvPicPr>
+              <p:nvPr/>
+            </p:nvPicPr>
+            <p:blipFill rotWithShape="1">
+              <a:blip r:embed="rId2">
+                <a:extLst>
+                  <a:ext uri="{28A0092B-C50C-407E-A947-70E740481C1C}">
+                    <a14:useLocalDpi xmlns:a14="http://schemas.microsoft.com/office/drawing/2010/main" val="0"/>
+                  </a:ext>
+                </a:extLst>
+              </a:blip>
+              <a:srcRect l="20375" t="18630" r="15918" b="18011"/>
+              <a:stretch/>
+            </p:blipFill>
+            <p:spPr>
+              <a:xfrm>
+                <a:off x="3824009" y="304800"/>
+                <a:ext cx="2975675" cy="2186040"/>
+              </a:xfrm>
+              <a:prstGeom prst="rect">
+                <a:avLst/>
+              </a:prstGeom>
+            </p:spPr>
+          </p:pic>
+          <p:sp>
+            <p:nvSpPr>
+              <p:cNvPr id="3" name="TextBox 2"/>
+              <p:cNvSpPr txBox="1"/>
+              <p:nvPr/>
+            </p:nvSpPr>
+            <p:spPr>
+              <a:xfrm>
+                <a:off x="5632931" y="1338590"/>
+                <a:ext cx="729687" cy="261610"/>
+              </a:xfrm>
+              <a:prstGeom prst="rect">
+                <a:avLst/>
+              </a:prstGeom>
+              <a:solidFill>
+                <a:schemeClr val="bg1"/>
+              </a:solidFill>
+            </p:spPr>
+            <p:txBody>
+              <a:bodyPr wrap="none" rtlCol="0">
+                <a:spAutoFit/>
+              </a:bodyPr>
+              <a:lstStyle/>
+              <a:p>
+                <a:r>
+                  <a:rPr lang="en-US" sz="1100" dirty="0" smtClean="0"/>
+                  <a:t>Epicenter</a:t>
+                </a:r>
+                <a:endParaRPr lang="en-US" sz="1100" dirty="0"/>
+              </a:p>
+            </p:txBody>
+          </p:sp>
+          <p:sp>
+            <p:nvSpPr>
+              <p:cNvPr id="2" name="5-Point Star 1"/>
+              <p:cNvSpPr/>
+              <p:nvPr/>
+            </p:nvSpPr>
+            <p:spPr>
+              <a:xfrm>
+                <a:off x="5576609" y="1397820"/>
+                <a:ext cx="91440" cy="91440"/>
+              </a:xfrm>
+              <a:prstGeom prst="star5">
+                <a:avLst/>
+              </a:prstGeom>
+            </p:spPr>
+            <p:style>
+              <a:lnRef idx="2">
+                <a:schemeClr val="accent2">
+                  <a:shade val="50000"/>
+                </a:schemeClr>
+              </a:lnRef>
+              <a:fillRef idx="1">
+                <a:schemeClr val="accent2"/>
+              </a:fillRef>
+              <a:effectRef idx="0">
+                <a:schemeClr val="accent2"/>
+              </a:effectRef>
+              <a:fontRef idx="minor">
+                <a:schemeClr val="lt1"/>
+              </a:fontRef>
+            </p:style>
+            <p:txBody>
+              <a:bodyPr rtlCol="0" anchor="ctr"/>
+              <a:lstStyle/>
+              <a:p>
+                <a:pPr algn="ctr"/>
+                <a:endParaRPr lang="en-US"/>
+              </a:p>
+            </p:txBody>
+          </p:sp>
+        </p:grpSp>
         <p:pic>
           <p:nvPicPr>
-            <p:cNvPr id="5" name="Picture 4"/>
-            <p:cNvPicPr>
-              <a:picLocks noChangeAspect="1"/>
-            </p:cNvPicPr>
-            <p:nvPr/>
-          </p:nvPicPr>
-          <p:blipFill rotWithShape="1">
-            <a:blip r:embed="rId2">
-              <a:extLst>
-                <a:ext uri="{28A0092B-C50C-407E-A947-70E740481C1C}">
-                  <a14:useLocalDpi xmlns:a14="http://schemas.microsoft.com/office/drawing/2010/main" val="0"/>
-                </a:ext>
-              </a:extLst>
-            </a:blip>
-            <a:srcRect l="20375" t="18630" r="15918" b="18011"/>
-            <a:stretch/>
-          </p:blipFill>
-          <p:spPr>
-            <a:xfrm>
-              <a:off x="1447800" y="228600"/>
-              <a:ext cx="2975675" cy="2186040"/>
-            </a:xfrm>
-            <a:prstGeom prst="rect">
-              <a:avLst/>
-            </a:prstGeom>
-          </p:spPr>
-        </p:pic>
-        <p:pic>
-          <p:nvPicPr>
-            <p:cNvPr id="6" name="Picture 5"/>
+            <p:cNvPr id="4" name="Picture 3"/>
             <p:cNvPicPr>
               <a:picLocks noChangeAspect="1"/>
             </p:cNvPicPr>
@@ -3217,8 +3274,8 @@
           </p:blipFill>
           <p:spPr>
             <a:xfrm>
-              <a:off x="1291525" y="3505200"/>
-              <a:ext cx="2823275" cy="1713106"/>
+              <a:off x="5942255" y="2184111"/>
+              <a:ext cx="2522192" cy="1752600"/>
             </a:xfrm>
             <a:prstGeom prst="rect">
               <a:avLst/>
@@ -3227,14 +3284,14 @@
         </p:pic>
         <p:pic>
           <p:nvPicPr>
-            <p:cNvPr id="4" name="Picture 3"/>
+            <p:cNvPr id="14" name="Picture 13"/>
             <p:cNvPicPr>
               <a:picLocks noChangeAspect="1"/>
             </p:cNvPicPr>
             <p:nvPr/>
           </p:nvPicPr>
           <p:blipFill>
-            <a:blip r:embed="rId4">
+            <a:blip r:embed="rId4" cstate="print">
               <a:extLst>
                 <a:ext uri="{28A0092B-C50C-407E-A947-70E740481C1C}">
                   <a14:useLocalDpi xmlns:a14="http://schemas.microsoft.com/office/drawing/2010/main" val="0"/>
@@ -3247,86 +3304,43 @@
           </p:blipFill>
           <p:spPr>
             <a:xfrm>
-              <a:off x="2806115" y="2133600"/>
-              <a:ext cx="2522192" cy="1752600"/>
+              <a:off x="228600" y="542605"/>
+              <a:ext cx="3497245" cy="2400941"/>
             </a:xfrm>
             <a:prstGeom prst="rect">
               <a:avLst/>
             </a:prstGeom>
           </p:spPr>
         </p:pic>
-        <p:sp>
-          <p:nvSpPr>
-            <p:cNvPr id="3" name="TextBox 2"/>
-            <p:cNvSpPr txBox="1"/>
+        <p:pic>
+          <p:nvPicPr>
+            <p:cNvPr id="13" name="Picture 12"/>
+            <p:cNvPicPr>
+              <a:picLocks noChangeAspect="1"/>
+            </p:cNvPicPr>
             <p:nvPr/>
-          </p:nvSpPr>
+          </p:nvPicPr>
+          <p:blipFill rotWithShape="1">
+            <a:blip r:embed="rId5" cstate="print">
+              <a:extLst>
+                <a:ext uri="{28A0092B-C50C-407E-A947-70E740481C1C}">
+                  <a14:useLocalDpi xmlns:a14="http://schemas.microsoft.com/office/drawing/2010/main" val="0"/>
+                </a:ext>
+              </a:extLst>
+            </a:blip>
+            <a:srcRect r="162" b="-754"/>
+            <a:stretch/>
+          </p:blipFill>
           <p:spPr>
             <a:xfrm>
-              <a:off x="3256722" y="1262390"/>
-              <a:ext cx="729687" cy="261610"/>
+              <a:off x="1019195" y="1130517"/>
+              <a:ext cx="3499556" cy="2873045"/>
             </a:xfrm>
             <a:prstGeom prst="rect">
               <a:avLst/>
             </a:prstGeom>
-            <a:solidFill>
-              <a:schemeClr val="bg1"/>
-            </a:solidFill>
           </p:spPr>
-          <p:txBody>
-            <a:bodyPr wrap="none" rtlCol="0">
-              <a:spAutoFit/>
-            </a:bodyPr>
-            <a:lstStyle/>
-            <a:p>
-              <a:r>
-                <a:rPr lang="en-US" sz="1100" dirty="0" smtClean="0"/>
-                <a:t>Epicenter</a:t>
-              </a:r>
-              <a:endParaRPr lang="en-US" sz="1100" dirty="0"/>
-            </a:p>
-          </p:txBody>
-        </p:sp>
-        <p:sp>
-          <p:nvSpPr>
-            <p:cNvPr id="2" name="5-Point Star 1"/>
-            <p:cNvSpPr/>
-            <p:nvPr/>
-          </p:nvSpPr>
-          <p:spPr>
-            <a:xfrm>
-              <a:off x="3200400" y="1321620"/>
-              <a:ext cx="91440" cy="91440"/>
-            </a:xfrm>
-            <a:prstGeom prst="star5">
-              <a:avLst/>
-            </a:prstGeom>
-          </p:spPr>
-          <p:style>
-            <a:lnRef idx="2">
-              <a:schemeClr val="accent2">
-                <a:shade val="50000"/>
-              </a:schemeClr>
-            </a:lnRef>
-            <a:fillRef idx="1">
-              <a:schemeClr val="accent2"/>
-            </a:fillRef>
-            <a:effectRef idx="0">
-              <a:schemeClr val="accent2"/>
-            </a:effectRef>
-            <a:fontRef idx="minor">
-              <a:schemeClr val="lt1"/>
-            </a:fontRef>
-          </p:style>
-          <p:txBody>
-            <a:bodyPr rtlCol="0" anchor="ctr"/>
-            <a:lstStyle/>
-            <a:p>
-              <a:pPr algn="ctr"/>
-              <a:endParaRPr lang="en-US"/>
-            </a:p>
-          </p:txBody>
-        </p:sp>
+        </p:pic>
       </p:grpSp>
     </p:spTree>
     <p:extLst>

</xml_diff>